<commit_message>
Archivo de Monitoreo Actualizado
</commit_message>
<xml_diff>
--- a/AsYouWish - Monitoreo Proyectos.pptx
+++ b/AsYouWish - Monitoreo Proyectos.pptx
@@ -5,12 +5,13 @@
     <p:sldMasterId id="2147483660" r:id="rId2"/>
   </p:sldMasterIdLst>
   <p:notesMasterIdLst>
-    <p:notesMasterId r:id="rId6"/>
+    <p:notesMasterId r:id="rId7"/>
   </p:notesMasterIdLst>
   <p:sldIdLst>
     <p:sldId id="256" r:id="rId3"/>
     <p:sldId id="1009" r:id="rId4"/>
-    <p:sldId id="1008" r:id="rId5"/>
+    <p:sldId id="1010" r:id="rId5"/>
+    <p:sldId id="1008" r:id="rId6"/>
   </p:sldIdLst>
   <p:sldSz cx="12192000" cy="6858000"/>
   <p:notesSz cx="6858000" cy="9144000"/>
@@ -116,6 +117,7 @@
           <p14:sldIdLst>
             <p14:sldId id="256"/>
             <p14:sldId id="1009"/>
+            <p14:sldId id="1010"/>
             <p14:sldId id="1008"/>
           </p14:sldIdLst>
         </p14:section>
@@ -230,7 +232,7 @@
           <a:p>
             <a:fld id="{EC13577B-6902-467D-A26C-08A0DD5E4E03}" type="datetimeFigureOut">
               <a:rPr lang="en-US" smtClean="0"/>
-              <a:t>9/30/2020</a:t>
+              <a:t>10/1/2020</a:t>
             </a:fld>
             <a:endParaRPr lang="en-US" dirty="0"/>
           </a:p>
@@ -793,7 +795,7 @@
           <a:p>
             <a:fld id="{04AD7083-2812-4336-A862-6CB4E9DAA666}" type="datetime1">
               <a:rPr lang="en-US" smtClean="0"/>
-              <a:t>9/30/2020</a:t>
+              <a:t>10/1/2020</a:t>
             </a:fld>
             <a:endParaRPr lang="en-US" dirty="0"/>
           </a:p>
@@ -1070,7 +1072,7 @@
           <a:p>
             <a:fld id="{F426DB13-0979-4AFD-BE5D-BA943E81C2FF}" type="datetime1">
               <a:rPr lang="en-US" smtClean="0"/>
-              <a:t>9/30/2020</a:t>
+              <a:t>10/1/2020</a:t>
             </a:fld>
             <a:endParaRPr lang="en-US" dirty="0"/>
           </a:p>
@@ -1352,7 +1354,7 @@
           <a:p>
             <a:fld id="{ACA095C1-F76B-4592-A3BF-48B4D1BF64A5}" type="datetime1">
               <a:rPr lang="en-US" smtClean="0"/>
-              <a:t>9/30/2020</a:t>
+              <a:t>10/1/2020</a:t>
             </a:fld>
             <a:endParaRPr lang="en-US" dirty="0"/>
           </a:p>
@@ -1713,7 +1715,7 @@
           <a:p>
             <a:fld id="{F68BAF15-D946-438F-BA57-43A568DB52D7}" type="datetime1">
               <a:rPr lang="en-US" smtClean="0"/>
-              <a:t>9/30/2020</a:t>
+              <a:t>10/1/2020</a:t>
             </a:fld>
             <a:endParaRPr lang="en-US" dirty="0"/>
           </a:p>
@@ -2013,7 +2015,7 @@
           <a:p>
             <a:fld id="{635A5B98-0E43-43A4-8C2A-E00A6A883A04}" type="datetime1">
               <a:rPr lang="en-US" smtClean="0"/>
-              <a:t>9/30/2020</a:t>
+              <a:t>10/1/2020</a:t>
             </a:fld>
             <a:endParaRPr lang="en-US" dirty="0"/>
           </a:p>
@@ -2528,7 +2530,7 @@
           <a:p>
             <a:fld id="{45FB536E-04DA-42C8-BC01-49FDB8623C5B}" type="datetime1">
               <a:rPr lang="en-US" smtClean="0"/>
-              <a:t>9/30/2020</a:t>
+              <a:t>10/1/2020</a:t>
             </a:fld>
             <a:endParaRPr lang="en-US" dirty="0"/>
           </a:p>
@@ -3173,7 +3175,7 @@
           <a:p>
             <a:fld id="{EE38660A-ACB5-4EAE-A29D-584DB55BAC5B}" type="datetime1">
               <a:rPr lang="en-US" smtClean="0"/>
-              <a:t>9/30/2020</a:t>
+              <a:t>10/1/2020</a:t>
             </a:fld>
             <a:endParaRPr lang="en-US" dirty="0"/>
           </a:p>
@@ -3398,7 +3400,7 @@
           <a:p>
             <a:fld id="{68130BA2-7F47-4355-A40B-1D4E78D026D1}" type="datetime1">
               <a:rPr lang="en-US" smtClean="0"/>
-              <a:t>9/30/2020</a:t>
+              <a:t>10/1/2020</a:t>
             </a:fld>
             <a:endParaRPr lang="en-US" dirty="0"/>
           </a:p>
@@ -3539,7 +3541,7 @@
           <a:p>
             <a:fld id="{0C7FF9F2-B4E6-461D-80C5-31D1DFDBE4F3}" type="datetime1">
               <a:rPr lang="en-US" smtClean="0"/>
-              <a:t>9/30/2020</a:t>
+              <a:t>10/1/2020</a:t>
             </a:fld>
             <a:endParaRPr lang="en-US" dirty="0"/>
           </a:p>
@@ -3876,7 +3878,7 @@
           <a:p>
             <a:fld id="{338DC08D-1485-4CDD-BD12-A2AAA137B289}" type="datetime1">
               <a:rPr lang="en-US" smtClean="0"/>
-              <a:t>9/30/2020</a:t>
+              <a:t>10/1/2020</a:t>
             </a:fld>
             <a:endParaRPr lang="en-US" dirty="0"/>
           </a:p>
@@ -4133,7 +4135,7 @@
           <a:p>
             <a:fld id="{13D2B1DD-5C24-46B3-BEAE-43189A8FCAFF}" type="datetime1">
               <a:rPr lang="en-US" smtClean="0"/>
-              <a:t>9/30/2020</a:t>
+              <a:t>10/1/2020</a:t>
             </a:fld>
             <a:endParaRPr lang="en-US" dirty="0"/>
           </a:p>
@@ -4346,7 +4348,7 @@
           <a:p>
             <a:fld id="{565BA3BC-6560-4C09-A047-A8DF1A0DE359}" type="datetime1">
               <a:rPr lang="en-US" smtClean="0"/>
-              <a:t>9/30/2020</a:t>
+              <a:t>10/1/2020</a:t>
             </a:fld>
             <a:endParaRPr lang="en-US" dirty="0"/>
           </a:p>
@@ -5334,6 +5336,245 @@
           <a:chExt cx="0" cy="0"/>
         </a:xfrm>
       </p:grpSpPr>
+      <p:sp>
+        <p:nvSpPr>
+          <p:cNvPr id="2" name="Título 1">
+            <a:extLst>
+              <a:ext uri="{FF2B5EF4-FFF2-40B4-BE49-F238E27FC236}">
+                <a16:creationId xmlns:a16="http://schemas.microsoft.com/office/drawing/2014/main" id="{C5E61F03-64FD-41EE-9C54-F91D96A7A973}"/>
+              </a:ext>
+            </a:extLst>
+          </p:cNvPr>
+          <p:cNvSpPr>
+            <a:spLocks noGrp="1"/>
+          </p:cNvSpPr>
+          <p:nvPr>
+            <p:ph type="title"/>
+          </p:nvPr>
+        </p:nvSpPr>
+        <p:spPr/>
+        <p:txBody>
+          <a:bodyPr/>
+          <a:lstStyle/>
+          <a:p>
+            <a:r>
+              <a:rPr lang="es-CL" dirty="0"/>
+              <a:t>Resumen &amp; Palabras Clave:</a:t>
+            </a:r>
+          </a:p>
+        </p:txBody>
+      </p:sp>
+      <p:sp>
+        <p:nvSpPr>
+          <p:cNvPr id="3" name="Marcador de contenido 2">
+            <a:extLst>
+              <a:ext uri="{FF2B5EF4-FFF2-40B4-BE49-F238E27FC236}">
+                <a16:creationId xmlns:a16="http://schemas.microsoft.com/office/drawing/2014/main" id="{47B4180E-8CBD-4E7C-8235-7CC0472BF53E}"/>
+              </a:ext>
+            </a:extLst>
+          </p:cNvPr>
+          <p:cNvSpPr>
+            <a:spLocks noGrp="1"/>
+          </p:cNvSpPr>
+          <p:nvPr>
+            <p:ph idx="1"/>
+          </p:nvPr>
+        </p:nvSpPr>
+        <p:spPr>
+          <a:xfrm>
+            <a:off x="838201" y="1825625"/>
+            <a:ext cx="11353799" cy="4351338"/>
+          </a:xfrm>
+        </p:spPr>
+        <p:txBody>
+          <a:bodyPr>
+            <a:normAutofit fontScale="77500" lnSpcReduction="20000"/>
+          </a:bodyPr>
+          <a:lstStyle/>
+          <a:p>
+            <a:r>
+              <a:rPr lang="es-CL" b="1" dirty="0"/>
+              <a:t>Resumen:</a:t>
+            </a:r>
+          </a:p>
+          <a:p>
+            <a:pPr>
+              <a:lnSpc>
+                <a:spcPct val="120000"/>
+              </a:lnSpc>
+            </a:pPr>
+            <a:r>
+              <a:rPr lang="es-ES" dirty="0"/>
+              <a:t>Es Proyecto "As </a:t>
+            </a:r>
+            <a:r>
+              <a:rPr lang="es-ES" dirty="0" err="1"/>
+              <a:t>You</a:t>
+            </a:r>
+            <a:r>
+              <a:rPr lang="es-ES" dirty="0"/>
+              <a:t> </a:t>
+            </a:r>
+            <a:r>
+              <a:rPr lang="es-ES" dirty="0" err="1"/>
+              <a:t>Wish</a:t>
+            </a:r>
+            <a:r>
+              <a:rPr lang="es-ES" dirty="0"/>
+              <a:t>", es el desarrollo de una Aplicación Web para una Cadena de Academias de Baile de nombre "As </a:t>
+            </a:r>
+            <a:r>
+              <a:rPr lang="es-ES" dirty="0" err="1"/>
+              <a:t>You</a:t>
+            </a:r>
+            <a:r>
+              <a:rPr lang="es-ES" dirty="0"/>
+              <a:t> </a:t>
+            </a:r>
+            <a:r>
+              <a:rPr lang="es-ES" dirty="0" err="1"/>
+              <a:t>Wish</a:t>
+            </a:r>
+            <a:r>
+              <a:rPr lang="es-ES" dirty="0"/>
+              <a:t>".</a:t>
+            </a:r>
+          </a:p>
+          <a:p>
+            <a:pPr>
+              <a:lnSpc>
+                <a:spcPct val="120000"/>
+              </a:lnSpc>
+            </a:pPr>
+            <a:r>
+              <a:rPr lang="es-ES" dirty="0"/>
+              <a:t>Se creo con el propósito de resolver la poca optimización de Administración y organización de diversos tipos de Datos que presentan las Academias.</a:t>
+            </a:r>
+          </a:p>
+          <a:p>
+            <a:endParaRPr lang="es-ES" dirty="0"/>
+          </a:p>
+          <a:p>
+            <a:r>
+              <a:rPr lang="es-CL" b="1" dirty="0"/>
+              <a:t>Palabras Clave:</a:t>
+            </a:r>
+          </a:p>
+          <a:p>
+            <a:pPr marL="285750" indent="-285750">
+              <a:buFont typeface="Arial" panose="020B0604020202020204" pitchFamily="34" charset="0"/>
+              <a:buChar char="•"/>
+            </a:pPr>
+            <a:r>
+              <a:rPr lang="es-CL" dirty="0"/>
+              <a:t>Desarrollo</a:t>
+            </a:r>
+          </a:p>
+          <a:p>
+            <a:pPr marL="285750" indent="-285750">
+              <a:buFont typeface="Arial" panose="020B0604020202020204" pitchFamily="34" charset="0"/>
+              <a:buChar char="•"/>
+            </a:pPr>
+            <a:r>
+              <a:rPr lang="es-CL" dirty="0"/>
+              <a:t>Aplicación</a:t>
+            </a:r>
+          </a:p>
+          <a:p>
+            <a:pPr marL="285750" indent="-285750">
+              <a:buFont typeface="Arial" panose="020B0604020202020204" pitchFamily="34" charset="0"/>
+              <a:buChar char="•"/>
+            </a:pPr>
+            <a:r>
+              <a:rPr lang="es-CL" dirty="0"/>
+              <a:t>Administrar</a:t>
+            </a:r>
+          </a:p>
+          <a:p>
+            <a:pPr marL="285750" indent="-285750">
+              <a:buFont typeface="Arial" panose="020B0604020202020204" pitchFamily="34" charset="0"/>
+              <a:buChar char="•"/>
+            </a:pPr>
+            <a:r>
+              <a:rPr lang="es-CL" dirty="0"/>
+              <a:t>Optimizar</a:t>
+            </a:r>
+          </a:p>
+          <a:p>
+            <a:pPr marL="285750" indent="-285750">
+              <a:buFont typeface="Arial" panose="020B0604020202020204" pitchFamily="34" charset="0"/>
+              <a:buChar char="•"/>
+            </a:pPr>
+            <a:endParaRPr lang="es-CL" b="1" dirty="0"/>
+          </a:p>
+          <a:p>
+            <a:pPr marL="285750" indent="-285750">
+              <a:buFont typeface="Arial" panose="020B0604020202020204" pitchFamily="34" charset="0"/>
+              <a:buChar char="•"/>
+            </a:pPr>
+            <a:endParaRPr lang="es-CL" b="1" dirty="0"/>
+          </a:p>
+        </p:txBody>
+      </p:sp>
+      <p:sp>
+        <p:nvSpPr>
+          <p:cNvPr id="4" name="Marcador de número de diapositiva 3">
+            <a:extLst>
+              <a:ext uri="{FF2B5EF4-FFF2-40B4-BE49-F238E27FC236}">
+                <a16:creationId xmlns:a16="http://schemas.microsoft.com/office/drawing/2014/main" id="{61E2CD26-32EA-4289-9E36-F624FA86BE24}"/>
+              </a:ext>
+            </a:extLst>
+          </p:cNvPr>
+          <p:cNvSpPr>
+            <a:spLocks noGrp="1"/>
+          </p:cNvSpPr>
+          <p:nvPr>
+            <p:ph type="sldNum" sz="quarter" idx="12"/>
+          </p:nvPr>
+        </p:nvSpPr>
+        <p:spPr/>
+        <p:txBody>
+          <a:bodyPr/>
+          <a:lstStyle/>
+          <a:p>
+            <a:fld id="{9860EDB8-5305-433F-BE41-D7A86D811DB3}" type="slidenum">
+              <a:rPr lang="en-US" smtClean="0"/>
+              <a:t>3</a:t>
+            </a:fld>
+            <a:endParaRPr lang="en-US" dirty="0"/>
+          </a:p>
+        </p:txBody>
+      </p:sp>
+    </p:spTree>
+    <p:extLst>
+      <p:ext uri="{BB962C8B-B14F-4D97-AF65-F5344CB8AC3E}">
+        <p14:creationId xmlns:p14="http://schemas.microsoft.com/office/powerpoint/2010/main" val="2001175802"/>
+      </p:ext>
+    </p:extLst>
+  </p:cSld>
+  <p:clrMapOvr>
+    <a:masterClrMapping/>
+  </p:clrMapOvr>
+</p:sld>
+</file>
+
+<file path=ppt/slides/slide4.xml><?xml version="1.0" encoding="utf-8"?>
+<p:sld xmlns:a="http://schemas.openxmlformats.org/drawingml/2006/main" xmlns:r="http://schemas.openxmlformats.org/officeDocument/2006/relationships" xmlns:p="http://schemas.openxmlformats.org/presentationml/2006/main">
+  <p:cSld>
+    <p:spTree>
+      <p:nvGrpSpPr>
+        <p:cNvPr id="1" name=""/>
+        <p:cNvGrpSpPr/>
+        <p:nvPr/>
+      </p:nvGrpSpPr>
+      <p:grpSpPr>
+        <a:xfrm>
+          <a:off x="0" y="0"/>
+          <a:ext cx="0" cy="0"/>
+          <a:chOff x="0" y="0"/>
+          <a:chExt cx="0" cy="0"/>
+        </a:xfrm>
+      </p:grpSpPr>
       <p:pic>
         <p:nvPicPr>
           <p:cNvPr id="36" name="Imagen 35" descr="Imagen que contiene Escala de tiempo&#10;&#10;Descripción generada automáticamente">
@@ -5433,7 +5674,7 @@
           <a:p>
             <a:fld id="{9860EDB8-5305-433F-BE41-D7A86D811DB3}" type="slidenum">
               <a:rPr lang="en-US" smtClean="0"/>
-              <a:t>3</a:t>
+              <a:t>4</a:t>
             </a:fld>
             <a:endParaRPr lang="en-US" dirty="0"/>
           </a:p>

</xml_diff>